<commit_message>
spring 2023 lecture 26 v2.0
</commit_message>
<xml_diff>
--- a/ppts/26_ts_reg.pptx
+++ b/ppts/26_ts_reg.pptx
@@ -22,6 +22,14 @@
     <p:sldId id="270" r:id="rId20"/>
     <p:sldId id="271" r:id="rId21"/>
     <p:sldId id="272" r:id="rId22"/>
+    <p:sldId id="273" r:id="rId23"/>
+    <p:sldId id="274" r:id="rId24"/>
+    <p:sldId id="275" r:id="rId25"/>
+    <p:sldId id="276" r:id="rId26"/>
+    <p:sldId id="277" r:id="rId27"/>
+    <p:sldId id="278" r:id="rId28"/>
+    <p:sldId id="279" r:id="rId29"/>
+    <p:sldId id="280" r:id="rId30"/>
   </p:sldIdLst>
   <p:sldSz cx="12192000" cy="6858000"/>
   <p:notesSz cx="6858000" cy="9144000"/>
@@ -3784,7 +3792,415 @@
 </p:sld>
 </file>
 
+<file path=ppt/slides/slide18.xml><?xml version="1.0" encoding="utf-8"?>
+<p:sld xmlns:a="http://schemas.openxmlformats.org/drawingml/2006/main" xmlns:r="http://schemas.openxmlformats.org/officeDocument/2006/relationships" xmlns:p="http://schemas.openxmlformats.org/presentationml/2006/main">
+  <p:cSld>
+    <p:spTree>
+      <p:nvGrpSpPr>
+        <p:cNvPr id="1" name=""/>
+        <p:cNvGrpSpPr/>
+        <p:nvPr/>
+      </p:nvGrpSpPr>
+      <p:grpSpPr>
+        <a:xfrm>
+          <a:off x="0" y="0"/>
+          <a:ext cx="0" cy="0"/>
+          <a:chOff x="0" y="0"/>
+          <a:chExt cx="0" cy="0"/>
+        </a:xfrm>
+      </p:grpSpPr>
+      <p:pic>
+        <p:nvPicPr>
+          <p:cNvPr id="2" name="" descr=""/>
+          <p:cNvPicPr>
+            <a:picLocks noGrp="1"/>
+          </p:cNvPicPr>
+          <p:nvPr>
+            <p:ph/>
+          </p:nvPr>
+        </p:nvPicPr>
+        <p:blipFill>
+          <a:blip cstate="print" r:embed="rId2"/>
+          <a:stretch>
+            <a:fillRect/>
+          </a:stretch>
+        </p:blipFill>
+        <p:spPr>
+          <a:xfrm>
+            <a:off x="0" y="0"/>
+            <a:ext cx="12192000" cy="6858000"/>
+          </a:xfrm>
+          <a:prstGeom prst="rect">
+            <a:avLst/>
+          </a:prstGeom>
+        </p:spPr>
+      </p:pic>
+    </p:spTree>
+  </p:cSld>
+  <p:clrMapOvr>
+    <a:masterClrMapping/>
+  </p:clrMapOvr>
+</p:sld>
+</file>
+
+<file path=ppt/slides/slide19.xml><?xml version="1.0" encoding="utf-8"?>
+<p:sld xmlns:a="http://schemas.openxmlformats.org/drawingml/2006/main" xmlns:r="http://schemas.openxmlformats.org/officeDocument/2006/relationships" xmlns:p="http://schemas.openxmlformats.org/presentationml/2006/main">
+  <p:cSld>
+    <p:spTree>
+      <p:nvGrpSpPr>
+        <p:cNvPr id="1" name=""/>
+        <p:cNvGrpSpPr/>
+        <p:nvPr/>
+      </p:nvGrpSpPr>
+      <p:grpSpPr>
+        <a:xfrm>
+          <a:off x="0" y="0"/>
+          <a:ext cx="0" cy="0"/>
+          <a:chOff x="0" y="0"/>
+          <a:chExt cx="0" cy="0"/>
+        </a:xfrm>
+      </p:grpSpPr>
+      <p:pic>
+        <p:nvPicPr>
+          <p:cNvPr id="2" name="" descr=""/>
+          <p:cNvPicPr>
+            <a:picLocks noGrp="1"/>
+          </p:cNvPicPr>
+          <p:nvPr>
+            <p:ph/>
+          </p:nvPr>
+        </p:nvPicPr>
+        <p:blipFill>
+          <a:blip cstate="print" r:embed="rId2"/>
+          <a:stretch>
+            <a:fillRect/>
+          </a:stretch>
+        </p:blipFill>
+        <p:spPr>
+          <a:xfrm>
+            <a:off x="0" y="0"/>
+            <a:ext cx="12192000" cy="6858000"/>
+          </a:xfrm>
+          <a:prstGeom prst="rect">
+            <a:avLst/>
+          </a:prstGeom>
+        </p:spPr>
+      </p:pic>
+    </p:spTree>
+  </p:cSld>
+  <p:clrMapOvr>
+    <a:masterClrMapping/>
+  </p:clrMapOvr>
+</p:sld>
+</file>
+
 <file path=ppt/slides/slide2.xml><?xml version="1.0" encoding="utf-8"?>
+<p:sld xmlns:a="http://schemas.openxmlformats.org/drawingml/2006/main" xmlns:r="http://schemas.openxmlformats.org/officeDocument/2006/relationships" xmlns:p="http://schemas.openxmlformats.org/presentationml/2006/main">
+  <p:cSld>
+    <p:spTree>
+      <p:nvGrpSpPr>
+        <p:cNvPr id="1" name=""/>
+        <p:cNvGrpSpPr/>
+        <p:nvPr/>
+      </p:nvGrpSpPr>
+      <p:grpSpPr>
+        <a:xfrm>
+          <a:off x="0" y="0"/>
+          <a:ext cx="0" cy="0"/>
+          <a:chOff x="0" y="0"/>
+          <a:chExt cx="0" cy="0"/>
+        </a:xfrm>
+      </p:grpSpPr>
+      <p:pic>
+        <p:nvPicPr>
+          <p:cNvPr id="2" name="" descr=""/>
+          <p:cNvPicPr>
+            <a:picLocks noGrp="1"/>
+          </p:cNvPicPr>
+          <p:nvPr>
+            <p:ph/>
+          </p:nvPr>
+        </p:nvPicPr>
+        <p:blipFill>
+          <a:blip cstate="print" r:embed="rId2"/>
+          <a:stretch>
+            <a:fillRect/>
+          </a:stretch>
+        </p:blipFill>
+        <p:spPr>
+          <a:xfrm>
+            <a:off x="0" y="0"/>
+            <a:ext cx="12192000" cy="6858000"/>
+          </a:xfrm>
+          <a:prstGeom prst="rect">
+            <a:avLst/>
+          </a:prstGeom>
+        </p:spPr>
+      </p:pic>
+    </p:spTree>
+  </p:cSld>
+  <p:clrMapOvr>
+    <a:masterClrMapping/>
+  </p:clrMapOvr>
+</p:sld>
+</file>
+
+<file path=ppt/slides/slide20.xml><?xml version="1.0" encoding="utf-8"?>
+<p:sld xmlns:a="http://schemas.openxmlformats.org/drawingml/2006/main" xmlns:r="http://schemas.openxmlformats.org/officeDocument/2006/relationships" xmlns:p="http://schemas.openxmlformats.org/presentationml/2006/main">
+  <p:cSld>
+    <p:spTree>
+      <p:nvGrpSpPr>
+        <p:cNvPr id="1" name=""/>
+        <p:cNvGrpSpPr/>
+        <p:nvPr/>
+      </p:nvGrpSpPr>
+      <p:grpSpPr>
+        <a:xfrm>
+          <a:off x="0" y="0"/>
+          <a:ext cx="0" cy="0"/>
+          <a:chOff x="0" y="0"/>
+          <a:chExt cx="0" cy="0"/>
+        </a:xfrm>
+      </p:grpSpPr>
+      <p:pic>
+        <p:nvPicPr>
+          <p:cNvPr id="2" name="" descr=""/>
+          <p:cNvPicPr>
+            <a:picLocks noGrp="1"/>
+          </p:cNvPicPr>
+          <p:nvPr>
+            <p:ph/>
+          </p:nvPr>
+        </p:nvPicPr>
+        <p:blipFill>
+          <a:blip cstate="print" r:embed="rId2"/>
+          <a:stretch>
+            <a:fillRect/>
+          </a:stretch>
+        </p:blipFill>
+        <p:spPr>
+          <a:xfrm>
+            <a:off x="0" y="0"/>
+            <a:ext cx="12192000" cy="6858000"/>
+          </a:xfrm>
+          <a:prstGeom prst="rect">
+            <a:avLst/>
+          </a:prstGeom>
+        </p:spPr>
+      </p:pic>
+    </p:spTree>
+  </p:cSld>
+  <p:clrMapOvr>
+    <a:masterClrMapping/>
+  </p:clrMapOvr>
+</p:sld>
+</file>
+
+<file path=ppt/slides/slide21.xml><?xml version="1.0" encoding="utf-8"?>
+<p:sld xmlns:a="http://schemas.openxmlformats.org/drawingml/2006/main" xmlns:r="http://schemas.openxmlformats.org/officeDocument/2006/relationships" xmlns:p="http://schemas.openxmlformats.org/presentationml/2006/main">
+  <p:cSld>
+    <p:spTree>
+      <p:nvGrpSpPr>
+        <p:cNvPr id="1" name=""/>
+        <p:cNvGrpSpPr/>
+        <p:nvPr/>
+      </p:nvGrpSpPr>
+      <p:grpSpPr>
+        <a:xfrm>
+          <a:off x="0" y="0"/>
+          <a:ext cx="0" cy="0"/>
+          <a:chOff x="0" y="0"/>
+          <a:chExt cx="0" cy="0"/>
+        </a:xfrm>
+      </p:grpSpPr>
+      <p:pic>
+        <p:nvPicPr>
+          <p:cNvPr id="2" name="" descr=""/>
+          <p:cNvPicPr>
+            <a:picLocks noGrp="1"/>
+          </p:cNvPicPr>
+          <p:nvPr>
+            <p:ph/>
+          </p:nvPr>
+        </p:nvPicPr>
+        <p:blipFill>
+          <a:blip cstate="print" r:embed="rId2"/>
+          <a:stretch>
+            <a:fillRect/>
+          </a:stretch>
+        </p:blipFill>
+        <p:spPr>
+          <a:xfrm>
+            <a:off x="0" y="0"/>
+            <a:ext cx="12192000" cy="6858000"/>
+          </a:xfrm>
+          <a:prstGeom prst="rect">
+            <a:avLst/>
+          </a:prstGeom>
+        </p:spPr>
+      </p:pic>
+    </p:spTree>
+  </p:cSld>
+  <p:clrMapOvr>
+    <a:masterClrMapping/>
+  </p:clrMapOvr>
+</p:sld>
+</file>
+
+<file path=ppt/slides/slide22.xml><?xml version="1.0" encoding="utf-8"?>
+<p:sld xmlns:a="http://schemas.openxmlformats.org/drawingml/2006/main" xmlns:r="http://schemas.openxmlformats.org/officeDocument/2006/relationships" xmlns:p="http://schemas.openxmlformats.org/presentationml/2006/main">
+  <p:cSld>
+    <p:spTree>
+      <p:nvGrpSpPr>
+        <p:cNvPr id="1" name=""/>
+        <p:cNvGrpSpPr/>
+        <p:nvPr/>
+      </p:nvGrpSpPr>
+      <p:grpSpPr>
+        <a:xfrm>
+          <a:off x="0" y="0"/>
+          <a:ext cx="0" cy="0"/>
+          <a:chOff x="0" y="0"/>
+          <a:chExt cx="0" cy="0"/>
+        </a:xfrm>
+      </p:grpSpPr>
+      <p:pic>
+        <p:nvPicPr>
+          <p:cNvPr id="2" name="" descr=""/>
+          <p:cNvPicPr>
+            <a:picLocks noGrp="1"/>
+          </p:cNvPicPr>
+          <p:nvPr>
+            <p:ph/>
+          </p:nvPr>
+        </p:nvPicPr>
+        <p:blipFill>
+          <a:blip cstate="print" r:embed="rId2"/>
+          <a:stretch>
+            <a:fillRect/>
+          </a:stretch>
+        </p:blipFill>
+        <p:spPr>
+          <a:xfrm>
+            <a:off x="0" y="0"/>
+            <a:ext cx="12192000" cy="6858000"/>
+          </a:xfrm>
+          <a:prstGeom prst="rect">
+            <a:avLst/>
+          </a:prstGeom>
+        </p:spPr>
+      </p:pic>
+    </p:spTree>
+  </p:cSld>
+  <p:clrMapOvr>
+    <a:masterClrMapping/>
+  </p:clrMapOvr>
+</p:sld>
+</file>
+
+<file path=ppt/slides/slide23.xml><?xml version="1.0" encoding="utf-8"?>
+<p:sld xmlns:a="http://schemas.openxmlformats.org/drawingml/2006/main" xmlns:r="http://schemas.openxmlformats.org/officeDocument/2006/relationships" xmlns:p="http://schemas.openxmlformats.org/presentationml/2006/main">
+  <p:cSld>
+    <p:spTree>
+      <p:nvGrpSpPr>
+        <p:cNvPr id="1" name=""/>
+        <p:cNvGrpSpPr/>
+        <p:nvPr/>
+      </p:nvGrpSpPr>
+      <p:grpSpPr>
+        <a:xfrm>
+          <a:off x="0" y="0"/>
+          <a:ext cx="0" cy="0"/>
+          <a:chOff x="0" y="0"/>
+          <a:chExt cx="0" cy="0"/>
+        </a:xfrm>
+      </p:grpSpPr>
+      <p:pic>
+        <p:nvPicPr>
+          <p:cNvPr id="2" name="" descr=""/>
+          <p:cNvPicPr>
+            <a:picLocks noGrp="1"/>
+          </p:cNvPicPr>
+          <p:nvPr>
+            <p:ph/>
+          </p:nvPr>
+        </p:nvPicPr>
+        <p:blipFill>
+          <a:blip cstate="print" r:embed="rId2"/>
+          <a:stretch>
+            <a:fillRect/>
+          </a:stretch>
+        </p:blipFill>
+        <p:spPr>
+          <a:xfrm>
+            <a:off x="0" y="0"/>
+            <a:ext cx="12192000" cy="6858000"/>
+          </a:xfrm>
+          <a:prstGeom prst="rect">
+            <a:avLst/>
+          </a:prstGeom>
+        </p:spPr>
+      </p:pic>
+    </p:spTree>
+  </p:cSld>
+  <p:clrMapOvr>
+    <a:masterClrMapping/>
+  </p:clrMapOvr>
+</p:sld>
+</file>
+
+<file path=ppt/slides/slide24.xml><?xml version="1.0" encoding="utf-8"?>
+<p:sld xmlns:a="http://schemas.openxmlformats.org/drawingml/2006/main" xmlns:r="http://schemas.openxmlformats.org/officeDocument/2006/relationships" xmlns:p="http://schemas.openxmlformats.org/presentationml/2006/main">
+  <p:cSld>
+    <p:spTree>
+      <p:nvGrpSpPr>
+        <p:cNvPr id="1" name=""/>
+        <p:cNvGrpSpPr/>
+        <p:nvPr/>
+      </p:nvGrpSpPr>
+      <p:grpSpPr>
+        <a:xfrm>
+          <a:off x="0" y="0"/>
+          <a:ext cx="0" cy="0"/>
+          <a:chOff x="0" y="0"/>
+          <a:chExt cx="0" cy="0"/>
+        </a:xfrm>
+      </p:grpSpPr>
+      <p:pic>
+        <p:nvPicPr>
+          <p:cNvPr id="2" name="" descr=""/>
+          <p:cNvPicPr>
+            <a:picLocks noGrp="1"/>
+          </p:cNvPicPr>
+          <p:nvPr>
+            <p:ph/>
+          </p:nvPr>
+        </p:nvPicPr>
+        <p:blipFill>
+          <a:blip cstate="print" r:embed="rId2"/>
+          <a:stretch>
+            <a:fillRect/>
+          </a:stretch>
+        </p:blipFill>
+        <p:spPr>
+          <a:xfrm>
+            <a:off x="0" y="0"/>
+            <a:ext cx="12192000" cy="6858000"/>
+          </a:xfrm>
+          <a:prstGeom prst="rect">
+            <a:avLst/>
+          </a:prstGeom>
+        </p:spPr>
+      </p:pic>
+    </p:spTree>
+  </p:cSld>
+  <p:clrMapOvr>
+    <a:masterClrMapping/>
+  </p:clrMapOvr>
+</p:sld>
+</file>
+
+<file path=ppt/slides/slide25.xml><?xml version="1.0" encoding="utf-8"?>
 <p:sld xmlns:a="http://schemas.openxmlformats.org/drawingml/2006/main" xmlns:r="http://schemas.openxmlformats.org/officeDocument/2006/relationships" xmlns:p="http://schemas.openxmlformats.org/presentationml/2006/main">
   <p:cSld>
     <p:spTree>

</xml_diff>